<commit_message>
changed uga duplicate detection
</commit_message>
<xml_diff>
--- a/figures/presfigs 2.pptx
+++ b/figures/presfigs 2.pptx
@@ -108,6 +108,11 @@
       </a:defRPr>
     </a:lvl9pPr>
   </p:defaultTextStyle>
+  <p:extLst>
+    <p:ext uri="{EFAFB233-063F-42B5-8137-9DF3F51BA10A}">
+      <p15:sldGuideLst xmlns:p15="http://schemas.microsoft.com/office/powerpoint/2012/main"/>
+    </p:ext>
+  </p:extLst>
 </p:presentation>
 </file>
 
@@ -193,7 +198,7 @@
           <a:p>
             <a:fld id="{59E81CFA-2469-6043-8A4F-A1943E02E6DE}" type="datetimeFigureOut">
               <a:rPr lang="en-US" smtClean="0"/>
-              <a:t>7/3/21</a:t>
+              <a:t>7/22/21</a:t>
             </a:fld>
             <a:endParaRPr lang="en-US"/>
           </a:p>
@@ -691,7 +696,7 @@
           <a:p>
             <a:fld id="{285A142F-426B-0F4B-9BBC-AB7DEA25178C}" type="datetimeFigureOut">
               <a:rPr lang="en-US" smtClean="0"/>
-              <a:t>7/3/21</a:t>
+              <a:t>7/22/21</a:t>
             </a:fld>
             <a:endParaRPr lang="en-US"/>
           </a:p>
@@ -889,7 +894,7 @@
           <a:p>
             <a:fld id="{285A142F-426B-0F4B-9BBC-AB7DEA25178C}" type="datetimeFigureOut">
               <a:rPr lang="en-US" smtClean="0"/>
-              <a:t>7/3/21</a:t>
+              <a:t>7/22/21</a:t>
             </a:fld>
             <a:endParaRPr lang="en-US"/>
           </a:p>
@@ -1097,7 +1102,7 @@
           <a:p>
             <a:fld id="{285A142F-426B-0F4B-9BBC-AB7DEA25178C}" type="datetimeFigureOut">
               <a:rPr lang="en-US" smtClean="0"/>
-              <a:t>7/3/21</a:t>
+              <a:t>7/22/21</a:t>
             </a:fld>
             <a:endParaRPr lang="en-US"/>
           </a:p>
@@ -1295,7 +1300,7 @@
           <a:p>
             <a:fld id="{285A142F-426B-0F4B-9BBC-AB7DEA25178C}" type="datetimeFigureOut">
               <a:rPr lang="en-US" smtClean="0"/>
-              <a:t>7/3/21</a:t>
+              <a:t>7/22/21</a:t>
             </a:fld>
             <a:endParaRPr lang="en-US"/>
           </a:p>
@@ -1570,7 +1575,7 @@
           <a:p>
             <a:fld id="{285A142F-426B-0F4B-9BBC-AB7DEA25178C}" type="datetimeFigureOut">
               <a:rPr lang="en-US" smtClean="0"/>
-              <a:t>7/3/21</a:t>
+              <a:t>7/22/21</a:t>
             </a:fld>
             <a:endParaRPr lang="en-US"/>
           </a:p>
@@ -1835,7 +1840,7 @@
           <a:p>
             <a:fld id="{285A142F-426B-0F4B-9BBC-AB7DEA25178C}" type="datetimeFigureOut">
               <a:rPr lang="en-US" smtClean="0"/>
-              <a:t>7/3/21</a:t>
+              <a:t>7/22/21</a:t>
             </a:fld>
             <a:endParaRPr lang="en-US"/>
           </a:p>
@@ -2247,7 +2252,7 @@
           <a:p>
             <a:fld id="{285A142F-426B-0F4B-9BBC-AB7DEA25178C}" type="datetimeFigureOut">
               <a:rPr lang="en-US" smtClean="0"/>
-              <a:t>7/3/21</a:t>
+              <a:t>7/22/21</a:t>
             </a:fld>
             <a:endParaRPr lang="en-US"/>
           </a:p>
@@ -2388,7 +2393,7 @@
           <a:p>
             <a:fld id="{285A142F-426B-0F4B-9BBC-AB7DEA25178C}" type="datetimeFigureOut">
               <a:rPr lang="en-US" smtClean="0"/>
-              <a:t>7/3/21</a:t>
+              <a:t>7/22/21</a:t>
             </a:fld>
             <a:endParaRPr lang="en-US"/>
           </a:p>
@@ -2501,7 +2506,7 @@
           <a:p>
             <a:fld id="{285A142F-426B-0F4B-9BBC-AB7DEA25178C}" type="datetimeFigureOut">
               <a:rPr lang="en-US" smtClean="0"/>
-              <a:t>7/3/21</a:t>
+              <a:t>7/22/21</a:t>
             </a:fld>
             <a:endParaRPr lang="en-US"/>
           </a:p>
@@ -2812,7 +2817,7 @@
           <a:p>
             <a:fld id="{285A142F-426B-0F4B-9BBC-AB7DEA25178C}" type="datetimeFigureOut">
               <a:rPr lang="en-US" smtClean="0"/>
-              <a:t>7/3/21</a:t>
+              <a:t>7/22/21</a:t>
             </a:fld>
             <a:endParaRPr lang="en-US"/>
           </a:p>
@@ -3100,7 +3105,7 @@
           <a:p>
             <a:fld id="{285A142F-426B-0F4B-9BBC-AB7DEA25178C}" type="datetimeFigureOut">
               <a:rPr lang="en-US" smtClean="0"/>
-              <a:t>7/3/21</a:t>
+              <a:t>7/22/21</a:t>
             </a:fld>
             <a:endParaRPr lang="en-US"/>
           </a:p>
@@ -3341,7 +3346,7 @@
           <a:p>
             <a:fld id="{285A142F-426B-0F4B-9BBC-AB7DEA25178C}" type="datetimeFigureOut">
               <a:rPr lang="en-US" smtClean="0"/>
-              <a:t>7/3/21</a:t>
+              <a:t>7/22/21</a:t>
             </a:fld>
             <a:endParaRPr lang="en-US"/>
           </a:p>
@@ -3760,10 +3765,10 @@
       </p:grpSpPr>
       <p:pic>
         <p:nvPicPr>
-          <p:cNvPr id="3" name="Picture 2" descr="Map&#10;&#10;Description automatically generated">
-            <a:extLst>
-              <a:ext uri="{FF2B5EF4-FFF2-40B4-BE49-F238E27FC236}">
-                <a16:creationId xmlns:a16="http://schemas.microsoft.com/office/drawing/2014/main" id="{5D7CC3B8-0AC7-9C41-BE3D-8E0A79F86FD5}"/>
+          <p:cNvPr id="11" name="Picture 10" descr="A picture containing light, traffic, outdoor, green&#10;&#10;Description automatically generated">
+            <a:extLst>
+              <a:ext uri="{FF2B5EF4-FFF2-40B4-BE49-F238E27FC236}">
+                <a16:creationId xmlns:a16="http://schemas.microsoft.com/office/drawing/2014/main" id="{8F56B055-D7C4-6144-B411-1B90D668EF85}"/>
               </a:ext>
             </a:extLst>
           </p:cNvPr>
@@ -3774,6 +3779,36 @@
         </p:nvPicPr>
         <p:blipFill>
           <a:blip r:embed="rId3"/>
+          <a:stretch>
+            <a:fillRect/>
+          </a:stretch>
+        </p:blipFill>
+        <p:spPr>
+          <a:xfrm>
+            <a:off x="3320140" y="-849678"/>
+            <a:ext cx="8730343" cy="8730343"/>
+          </a:xfrm>
+          <a:prstGeom prst="rect">
+            <a:avLst/>
+          </a:prstGeom>
+        </p:spPr>
+      </p:pic>
+      <p:pic>
+        <p:nvPicPr>
+          <p:cNvPr id="3" name="Picture 2" descr="Map&#10;&#10;Description automatically generated">
+            <a:extLst>
+              <a:ext uri="{FF2B5EF4-FFF2-40B4-BE49-F238E27FC236}">
+                <a16:creationId xmlns:a16="http://schemas.microsoft.com/office/drawing/2014/main" id="{5D7CC3B8-0AC7-9C41-BE3D-8E0A79F86FD5}"/>
+              </a:ext>
+            </a:extLst>
+          </p:cNvPr>
+          <p:cNvPicPr>
+            <a:picLocks noChangeAspect="1"/>
+          </p:cNvPicPr>
+          <p:nvPr/>
+        </p:nvPicPr>
+        <p:blipFill>
+          <a:blip r:embed="rId4"/>
           <a:stretch>
             <a:fillRect/>
           </a:stretch>
@@ -3790,10 +3825,10 @@
       </p:pic>
       <p:pic>
         <p:nvPicPr>
-          <p:cNvPr id="11" name="Picture 10" descr="A picture containing light, traffic, outdoor, green&#10;&#10;Description automatically generated">
-            <a:extLst>
-              <a:ext uri="{FF2B5EF4-FFF2-40B4-BE49-F238E27FC236}">
-                <a16:creationId xmlns:a16="http://schemas.microsoft.com/office/drawing/2014/main" id="{8F56B055-D7C4-6144-B411-1B90D668EF85}"/>
+          <p:cNvPr id="4" name="Picture 3" descr="A picture containing star, dark, night, night sky&#10;&#10;Description automatically generated">
+            <a:extLst>
+              <a:ext uri="{FF2B5EF4-FFF2-40B4-BE49-F238E27FC236}">
+                <a16:creationId xmlns:a16="http://schemas.microsoft.com/office/drawing/2014/main" id="{A2DF700D-0E45-3C48-9A54-DCDF9972AA36}"/>
               </a:ext>
             </a:extLst>
           </p:cNvPr>
@@ -3802,16 +3837,15 @@
           </p:cNvPicPr>
           <p:nvPr/>
         </p:nvPicPr>
-        <p:blipFill>
-          <a:blip r:embed="rId4"/>
-          <a:stretch>
-            <a:fillRect/>
-          </a:stretch>
+        <p:blipFill rotWithShape="1">
+          <a:blip r:embed="rId5"/>
+          <a:srcRect l="48110" t="32276" b="8154"/>
+          <a:stretch/>
         </p:blipFill>
         <p:spPr>
           <a:xfrm>
-            <a:off x="3320140" y="-849678"/>
-            <a:ext cx="8730343" cy="8730343"/>
+            <a:off x="3010176" y="-149697"/>
+            <a:ext cx="6854549" cy="7869092"/>
           </a:xfrm>
           <a:prstGeom prst="rect">
             <a:avLst/>
@@ -3850,10 +3884,10 @@
       </p:grpSpPr>
       <p:pic>
         <p:nvPicPr>
-          <p:cNvPr id="3" name="Picture 2" descr="Map&#10;&#10;Description automatically generated">
-            <a:extLst>
-              <a:ext uri="{FF2B5EF4-FFF2-40B4-BE49-F238E27FC236}">
-                <a16:creationId xmlns:a16="http://schemas.microsoft.com/office/drawing/2014/main" id="{8DB452EB-8387-B84A-9288-98928CC03088}"/>
+          <p:cNvPr id="5" name="Picture 4" descr="A picture containing silhouette, night sky&#10;&#10;Description automatically generated">
+            <a:extLst>
+              <a:ext uri="{FF2B5EF4-FFF2-40B4-BE49-F238E27FC236}">
+                <a16:creationId xmlns:a16="http://schemas.microsoft.com/office/drawing/2014/main" id="{DD975DCF-F46B-984A-829C-2CDF5068999E}"/>
               </a:ext>
             </a:extLst>
           </p:cNvPr>
@@ -3864,6 +3898,36 @@
         </p:nvPicPr>
         <p:blipFill>
           <a:blip r:embed="rId2"/>
+          <a:stretch>
+            <a:fillRect/>
+          </a:stretch>
+        </p:blipFill>
+        <p:spPr>
+          <a:xfrm>
+            <a:off x="828575" y="-457200"/>
+            <a:ext cx="8889274" cy="8889274"/>
+          </a:xfrm>
+          <a:prstGeom prst="rect">
+            <a:avLst/>
+          </a:prstGeom>
+        </p:spPr>
+      </p:pic>
+      <p:pic>
+        <p:nvPicPr>
+          <p:cNvPr id="3" name="Picture 2" descr="Map&#10;&#10;Description automatically generated">
+            <a:extLst>
+              <a:ext uri="{FF2B5EF4-FFF2-40B4-BE49-F238E27FC236}">
+                <a16:creationId xmlns:a16="http://schemas.microsoft.com/office/drawing/2014/main" id="{8DB452EB-8387-B84A-9288-98928CC03088}"/>
+              </a:ext>
+            </a:extLst>
+          </p:cNvPr>
+          <p:cNvPicPr>
+            <a:picLocks noChangeAspect="1"/>
+          </p:cNvPicPr>
+          <p:nvPr/>
+        </p:nvPicPr>
+        <p:blipFill>
+          <a:blip r:embed="rId3"/>
           <a:stretch>
             <a:fillRect/>
           </a:stretch>
@@ -3880,10 +3944,10 @@
       </p:pic>
       <p:pic>
         <p:nvPicPr>
-          <p:cNvPr id="5" name="Picture 4" descr="A picture containing silhouette, night sky&#10;&#10;Description automatically generated">
-            <a:extLst>
-              <a:ext uri="{FF2B5EF4-FFF2-40B4-BE49-F238E27FC236}">
-                <a16:creationId xmlns:a16="http://schemas.microsoft.com/office/drawing/2014/main" id="{DD975DCF-F46B-984A-829C-2CDF5068999E}"/>
+          <p:cNvPr id="7" name="Picture 6" descr="A picture containing star, silhouette, night sky&#10;&#10;Description automatically generated">
+            <a:extLst>
+              <a:ext uri="{FF2B5EF4-FFF2-40B4-BE49-F238E27FC236}">
+                <a16:creationId xmlns:a16="http://schemas.microsoft.com/office/drawing/2014/main" id="{1E00C9B0-E511-DC4A-9234-9A5FC65351E5}"/>
               </a:ext>
             </a:extLst>
           </p:cNvPr>
@@ -3893,7 +3957,7 @@
           <p:nvPr/>
         </p:nvPicPr>
         <p:blipFill>
-          <a:blip r:embed="rId3"/>
+          <a:blip r:embed="rId4"/>
           <a:stretch>
             <a:fillRect/>
           </a:stretch>
@@ -3901,7 +3965,7 @@
         <p:spPr>
           <a:xfrm>
             <a:off x="828575" y="-457200"/>
-            <a:ext cx="8889274" cy="8889274"/>
+            <a:ext cx="8978012" cy="8978012"/>
           </a:xfrm>
           <a:prstGeom prst="rect">
             <a:avLst/>

</xml_diff>